<commit_message>
updated slides for Supervisor Meeting 3
</commit_message>
<xml_diff>
--- a/presentations/Supervisor Meeting 3.pptx
+++ b/presentations/Supervisor Meeting 3.pptx
@@ -226,11 +226,11 @@
           <c:showBubbleSize val="0"/>
         </c:dLbls>
         <c:gapWidth val="150"/>
-        <c:axId val="166800000"/>
-        <c:axId val="166801792"/>
+        <c:axId val="101024128"/>
+        <c:axId val="101025664"/>
       </c:barChart>
       <c:catAx>
-        <c:axId val="166800000"/>
+        <c:axId val="101024128"/>
         <c:scaling>
           <c:orientation val="minMax"/>
         </c:scaling>
@@ -239,7 +239,7 @@
         <c:majorTickMark val="out"/>
         <c:minorTickMark val="none"/>
         <c:tickLblPos val="nextTo"/>
-        <c:crossAx val="166801792"/>
+        <c:crossAx val="101025664"/>
         <c:crosses val="autoZero"/>
         <c:auto val="1"/>
         <c:lblAlgn val="ctr"/>
@@ -247,7 +247,7 @@
         <c:noMultiLvlLbl val="0"/>
       </c:catAx>
       <c:valAx>
-        <c:axId val="166801792"/>
+        <c:axId val="101025664"/>
         <c:scaling>
           <c:orientation val="minMax"/>
         </c:scaling>
@@ -258,7 +258,7 @@
         <c:majorTickMark val="out"/>
         <c:minorTickMark val="none"/>
         <c:tickLblPos val="nextTo"/>
-        <c:crossAx val="166800000"/>
+        <c:crossAx val="101024128"/>
         <c:crosses val="autoZero"/>
         <c:crossBetween val="between"/>
       </c:valAx>
@@ -385,11 +385,11 @@
           <c:showBubbleSize val="0"/>
         </c:dLbls>
         <c:gapWidth val="150"/>
-        <c:axId val="166867712"/>
-        <c:axId val="166869248"/>
+        <c:axId val="101064704"/>
+        <c:axId val="101066240"/>
       </c:barChart>
       <c:catAx>
-        <c:axId val="166867712"/>
+        <c:axId val="101064704"/>
         <c:scaling>
           <c:orientation val="minMax"/>
         </c:scaling>
@@ -398,7 +398,7 @@
         <c:majorTickMark val="out"/>
         <c:minorTickMark val="none"/>
         <c:tickLblPos val="nextTo"/>
-        <c:crossAx val="166869248"/>
+        <c:crossAx val="101066240"/>
         <c:crosses val="autoZero"/>
         <c:auto val="1"/>
         <c:lblAlgn val="ctr"/>
@@ -406,7 +406,7 @@
         <c:noMultiLvlLbl val="0"/>
       </c:catAx>
       <c:valAx>
-        <c:axId val="166869248"/>
+        <c:axId val="101066240"/>
         <c:scaling>
           <c:orientation val="minMax"/>
           <c:min val="0"/>
@@ -418,7 +418,7 @@
         <c:majorTickMark val="out"/>
         <c:minorTickMark val="none"/>
         <c:tickLblPos val="nextTo"/>
-        <c:crossAx val="166867712"/>
+        <c:crossAx val="101064704"/>
         <c:crosses val="autoZero"/>
         <c:crossBetween val="between"/>
       </c:valAx>
@@ -530,7 +530,7 @@
           <a:p>
             <a:fld id="{2240D66A-39CA-4FA9-A154-B7676CD3ECF5}" type="datetimeFigureOut">
               <a:rPr lang="en-US" smtClean="0"/>
-              <a:t>27/10/2015</a:t>
+              <a:t>28/10/2015</a:t>
             </a:fld>
             <a:endParaRPr lang="en-US"/>
           </a:p>
@@ -2197,7 +2197,7 @@
           <a:p>
             <a:fld id="{A201C83F-DD16-4130-875C-813686C5E287}" type="datetimeFigureOut">
               <a:rPr lang="en-US" smtClean="0"/>
-              <a:t>27/10/2015</a:t>
+              <a:t>28/10/2015</a:t>
             </a:fld>
             <a:endParaRPr lang="en-US"/>
           </a:p>
@@ -2396,7 +2396,7 @@
           <a:p>
             <a:fld id="{A201C83F-DD16-4130-875C-813686C5E287}" type="datetimeFigureOut">
               <a:rPr lang="en-US" smtClean="0"/>
-              <a:t>27/10/2015</a:t>
+              <a:t>28/10/2015</a:t>
             </a:fld>
             <a:endParaRPr lang="en-US"/>
           </a:p>
@@ -2586,7 +2586,7 @@
           <a:p>
             <a:fld id="{A201C83F-DD16-4130-875C-813686C5E287}" type="datetimeFigureOut">
               <a:rPr lang="en-US" smtClean="0"/>
-              <a:t>27/10/2015</a:t>
+              <a:t>28/10/2015</a:t>
             </a:fld>
             <a:endParaRPr lang="en-US"/>
           </a:p>
@@ -2778,7 +2778,7 @@
           <a:p>
             <a:fld id="{A201C83F-DD16-4130-875C-813686C5E287}" type="datetimeFigureOut">
               <a:rPr lang="en-US" smtClean="0"/>
-              <a:t>27/10/2015</a:t>
+              <a:t>28/10/2015</a:t>
             </a:fld>
             <a:endParaRPr lang="en-US"/>
           </a:p>
@@ -3004,7 +3004,7 @@
           <a:p>
             <a:fld id="{A201C83F-DD16-4130-875C-813686C5E287}" type="datetimeFigureOut">
               <a:rPr lang="en-US" smtClean="0"/>
-              <a:t>27/10/2015</a:t>
+              <a:t>28/10/2015</a:t>
             </a:fld>
             <a:endParaRPr lang="en-US"/>
           </a:p>
@@ -3295,7 +3295,7 @@
           <a:p>
             <a:fld id="{A201C83F-DD16-4130-875C-813686C5E287}" type="datetimeFigureOut">
               <a:rPr lang="en-US" smtClean="0"/>
-              <a:t>27/10/2015</a:t>
+              <a:t>28/10/2015</a:t>
             </a:fld>
             <a:endParaRPr lang="en-US"/>
           </a:p>
@@ -3726,7 +3726,7 @@
           <a:p>
             <a:fld id="{A201C83F-DD16-4130-875C-813686C5E287}" type="datetimeFigureOut">
               <a:rPr lang="en-US" smtClean="0"/>
-              <a:t>27/10/2015</a:t>
+              <a:t>28/10/2015</a:t>
             </a:fld>
             <a:endParaRPr lang="en-US"/>
           </a:p>
@@ -3852,7 +3852,7 @@
           <a:p>
             <a:fld id="{A201C83F-DD16-4130-875C-813686C5E287}" type="datetimeFigureOut">
               <a:rPr lang="en-US" smtClean="0"/>
-              <a:t>27/10/2015</a:t>
+              <a:t>28/10/2015</a:t>
             </a:fld>
             <a:endParaRPr lang="en-US"/>
           </a:p>
@@ -3955,7 +3955,7 @@
           <a:p>
             <a:fld id="{A201C83F-DD16-4130-875C-813686C5E287}" type="datetimeFigureOut">
               <a:rPr lang="en-US" smtClean="0"/>
-              <a:t>27/10/2015</a:t>
+              <a:t>28/10/2015</a:t>
             </a:fld>
             <a:endParaRPr lang="en-US"/>
           </a:p>
@@ -4224,7 +4224,7 @@
           <a:p>
             <a:fld id="{A201C83F-DD16-4130-875C-813686C5E287}" type="datetimeFigureOut">
               <a:rPr lang="en-US" smtClean="0"/>
-              <a:t>27/10/2015</a:t>
+              <a:t>28/10/2015</a:t>
             </a:fld>
             <a:endParaRPr lang="en-US"/>
           </a:p>
@@ -4588,7 +4588,7 @@
           <a:p>
             <a:fld id="{A201C83F-DD16-4130-875C-813686C5E287}" type="datetimeFigureOut">
               <a:rPr lang="en-US" smtClean="0"/>
-              <a:t>27/10/2015</a:t>
+              <a:t>28/10/2015</a:t>
             </a:fld>
             <a:endParaRPr lang="en-US"/>
           </a:p>
@@ -4943,7 +4943,7 @@
           <a:p>
             <a:fld id="{A201C83F-DD16-4130-875C-813686C5E287}" type="datetimeFigureOut">
               <a:rPr lang="en-US" smtClean="0"/>
-              <a:t>27/10/2015</a:t>
+              <a:t>28/10/2015</a:t>
             </a:fld>
             <a:endParaRPr lang="en-US"/>
           </a:p>
@@ -7312,8 +7312,13 @@
             </a:pPr>
             <a:r>
               <a:rPr lang="en-US" sz="6000" b="1" dirty="0" smtClean="0"/>
-              <a:t>100%</a:t>
-            </a:r>
+              <a:t>75</a:t>
+            </a:r>
+            <a:r>
+              <a:rPr lang="en-US" sz="6000" b="1" dirty="0" smtClean="0"/>
+              <a:t>%</a:t>
+            </a:r>
+            <a:endParaRPr lang="en-US" sz="6000" b="1" dirty="0" smtClean="0"/>
           </a:p>
           <a:p>
             <a:pPr marL="0" indent="0">
@@ -7829,7 +7834,15 @@
           <a:p>
             <a:r>
               <a:rPr lang="en-US" dirty="0" smtClean="0"/>
-              <a:t>Task done/Total Task : [4/4]</a:t>
+              <a:t>Task done/Total Task : </a:t>
+            </a:r>
+            <a:r>
+              <a:rPr lang="en-US" dirty="0" smtClean="0"/>
+              <a:t>[3/4</a:t>
+            </a:r>
+            <a:r>
+              <a:rPr lang="en-US" dirty="0" smtClean="0"/>
+              <a:t>]</a:t>
             </a:r>
           </a:p>
           <a:p>
@@ -7909,7 +7922,7 @@
         </p:style>
         <p:txBody>
           <a:bodyPr vert="horz">
-            <a:normAutofit fontScale="85000" lnSpcReduction="20000"/>
+            <a:normAutofit lnSpcReduction="10000"/>
           </a:bodyPr>
           <a:lstStyle>
             <a:lvl1pPr marL="274320" indent="-274320" algn="l" rtl="0" eaLnBrk="1" latinLnBrk="0" hangingPunct="1">
@@ -8136,42 +8149,24 @@
               </a:rPr>
               <a:t>DELAYED </a:t>
             </a:r>
+            <a:endParaRPr lang="en-US" dirty="0" smtClean="0">
+              <a:solidFill>
+                <a:srgbClr val="7030A0"/>
+              </a:solidFill>
+            </a:endParaRPr>
+          </a:p>
+          <a:p>
+            <a:pPr marL="0" indent="0">
+              <a:buNone/>
+            </a:pPr>
             <a:r>
               <a:rPr lang="en-US" dirty="0" smtClean="0">
                 <a:solidFill>
                   <a:srgbClr val="7030A0"/>
                 </a:solidFill>
               </a:rPr>
-              <a:t>BY </a:t>
-            </a:r>
-            <a:r>
-              <a:rPr lang="en-US" dirty="0">
-                <a:solidFill>
-                  <a:srgbClr val="7030A0"/>
-                </a:solidFill>
-              </a:rPr>
-              <a:t>3</a:t>
-            </a:r>
-            <a:r>
-              <a:rPr lang="en-US" dirty="0" smtClean="0">
-                <a:solidFill>
-                  <a:srgbClr val="7030A0"/>
-                </a:solidFill>
-              </a:rPr>
-              <a:t> DAYS – After using Iteration 5’s buffer of 7 days</a:t>
-            </a:r>
-          </a:p>
-          <a:p>
-            <a:endParaRPr lang="en-US" dirty="0">
-              <a:solidFill>
-                <a:srgbClr val="7030A0"/>
-              </a:solidFill>
-            </a:endParaRPr>
-          </a:p>
-          <a:p>
-            <a:pPr marL="0" indent="0">
-              <a:buNone/>
-            </a:pPr>
+              <a:t>By 1 week</a:t>
+            </a:r>
             <a:endParaRPr lang="en-US" dirty="0"/>
           </a:p>
         </p:txBody>

</xml_diff>

<commit_message>
edited slides for supervisor meeting
</commit_message>
<xml_diff>
--- a/presentations/Supervisor Meeting 3.pptx
+++ b/presentations/Supervisor Meeting 3.pptx
@@ -226,11 +226,11 @@
           <c:showBubbleSize val="0"/>
         </c:dLbls>
         <c:gapWidth val="150"/>
-        <c:axId val="101024128"/>
-        <c:axId val="101025664"/>
+        <c:axId val="68237952"/>
+        <c:axId val="68477312"/>
       </c:barChart>
       <c:catAx>
-        <c:axId val="101024128"/>
+        <c:axId val="68237952"/>
         <c:scaling>
           <c:orientation val="minMax"/>
         </c:scaling>
@@ -239,7 +239,7 @@
         <c:majorTickMark val="out"/>
         <c:minorTickMark val="none"/>
         <c:tickLblPos val="nextTo"/>
-        <c:crossAx val="101025664"/>
+        <c:crossAx val="68477312"/>
         <c:crosses val="autoZero"/>
         <c:auto val="1"/>
         <c:lblAlgn val="ctr"/>
@@ -247,7 +247,7 @@
         <c:noMultiLvlLbl val="0"/>
       </c:catAx>
       <c:valAx>
-        <c:axId val="101025664"/>
+        <c:axId val="68477312"/>
         <c:scaling>
           <c:orientation val="minMax"/>
         </c:scaling>
@@ -258,7 +258,7 @@
         <c:majorTickMark val="out"/>
         <c:minorTickMark val="none"/>
         <c:tickLblPos val="nextTo"/>
-        <c:crossAx val="101024128"/>
+        <c:crossAx val="68237952"/>
         <c:crosses val="autoZero"/>
         <c:crossBetween val="between"/>
       </c:valAx>
@@ -385,11 +385,11 @@
           <c:showBubbleSize val="0"/>
         </c:dLbls>
         <c:gapWidth val="150"/>
-        <c:axId val="101064704"/>
-        <c:axId val="101066240"/>
+        <c:axId val="68560384"/>
+        <c:axId val="68561920"/>
       </c:barChart>
       <c:catAx>
-        <c:axId val="101064704"/>
+        <c:axId val="68560384"/>
         <c:scaling>
           <c:orientation val="minMax"/>
         </c:scaling>
@@ -398,7 +398,7 @@
         <c:majorTickMark val="out"/>
         <c:minorTickMark val="none"/>
         <c:tickLblPos val="nextTo"/>
-        <c:crossAx val="101066240"/>
+        <c:crossAx val="68561920"/>
         <c:crosses val="autoZero"/>
         <c:auto val="1"/>
         <c:lblAlgn val="ctr"/>
@@ -406,7 +406,7 @@
         <c:noMultiLvlLbl val="0"/>
       </c:catAx>
       <c:valAx>
-        <c:axId val="101066240"/>
+        <c:axId val="68561920"/>
         <c:scaling>
           <c:orientation val="minMax"/>
           <c:min val="0"/>
@@ -418,7 +418,7 @@
         <c:majorTickMark val="out"/>
         <c:minorTickMark val="none"/>
         <c:tickLblPos val="nextTo"/>
-        <c:crossAx val="101064704"/>
+        <c:crossAx val="68560384"/>
         <c:crosses val="autoZero"/>
         <c:crossBetween val="between"/>
       </c:valAx>
@@ -7312,13 +7312,8 @@
             </a:pPr>
             <a:r>
               <a:rPr lang="en-US" sz="6000" b="1" dirty="0" smtClean="0"/>
-              <a:t>75</a:t>
-            </a:r>
-            <a:r>
-              <a:rPr lang="en-US" sz="6000" b="1" dirty="0" smtClean="0"/>
-              <a:t>%</a:t>
-            </a:r>
-            <a:endParaRPr lang="en-US" sz="6000" b="1" dirty="0" smtClean="0"/>
+              <a:t>75%</a:t>
+            </a:r>
           </a:p>
           <a:p>
             <a:pPr marL="0" indent="0">
@@ -7834,15 +7829,7 @@
           <a:p>
             <a:r>
               <a:rPr lang="en-US" dirty="0" smtClean="0"/>
-              <a:t>Task done/Total Task : </a:t>
-            </a:r>
-            <a:r>
-              <a:rPr lang="en-US" dirty="0" smtClean="0"/>
-              <a:t>[3/4</a:t>
-            </a:r>
-            <a:r>
-              <a:rPr lang="en-US" dirty="0" smtClean="0"/>
-              <a:t>]</a:t>
+              <a:t>Task done/Total Task : [3/4]</a:t>
             </a:r>
           </a:p>
           <a:p>
@@ -8468,7 +8455,7 @@
                   <a:schemeClr val="tx1"/>
                 </a:solidFill>
               </a:rPr>
-              <a:t>7</a:t>
+              <a:t>8</a:t>
             </a:r>
             <a:endParaRPr lang="en-US" sz="4000" dirty="0">
               <a:solidFill>
@@ -8570,7 +8557,7 @@
           <p:nvPr>
             <p:extLst>
               <p:ext uri="{D42A27DB-BD31-4B8C-83A1-F6EECF244321}">
-                <p14:modId xmlns:p14="http://schemas.microsoft.com/office/powerpoint/2010/main" val="959970067"/>
+                <p14:modId xmlns:p14="http://schemas.microsoft.com/office/powerpoint/2010/main" val="2153983580"/>
               </p:ext>
             </p:extLst>
           </p:nvPr>
@@ -8716,8 +8703,12 @@
                     <a:lstStyle/>
                     <a:p>
                       <a:r>
-                        <a:rPr lang="en-US" dirty="0" smtClean="0"/>
-                        <a:t>Still debugging</a:t>
+                        <a:rPr lang="en-US" smtClean="0"/>
+                        <a:t>Still </a:t>
+                      </a:r>
+                      <a:r>
+                        <a:rPr lang="en-US" smtClean="0"/>
+                        <a:t>debugging</a:t>
                       </a:r>
                       <a:endParaRPr lang="en-US" dirty="0"/>
                     </a:p>

</xml_diff>

<commit_message>
updated supervisor meeting 3 slides
</commit_message>
<xml_diff>
--- a/presentations/Supervisor Meeting 3.pptx
+++ b/presentations/Supervisor Meeting 3.pptx
@@ -226,11 +226,11 @@
           <c:showBubbleSize val="0"/>
         </c:dLbls>
         <c:gapWidth val="150"/>
-        <c:axId val="68237952"/>
-        <c:axId val="68477312"/>
+        <c:axId val="67613824"/>
+        <c:axId val="67615360"/>
       </c:barChart>
       <c:catAx>
-        <c:axId val="68237952"/>
+        <c:axId val="67613824"/>
         <c:scaling>
           <c:orientation val="minMax"/>
         </c:scaling>
@@ -239,7 +239,7 @@
         <c:majorTickMark val="out"/>
         <c:minorTickMark val="none"/>
         <c:tickLblPos val="nextTo"/>
-        <c:crossAx val="68477312"/>
+        <c:crossAx val="67615360"/>
         <c:crosses val="autoZero"/>
         <c:auto val="1"/>
         <c:lblAlgn val="ctr"/>
@@ -247,7 +247,7 @@
         <c:noMultiLvlLbl val="0"/>
       </c:catAx>
       <c:valAx>
-        <c:axId val="68477312"/>
+        <c:axId val="67615360"/>
         <c:scaling>
           <c:orientation val="minMax"/>
         </c:scaling>
@@ -258,7 +258,7 @@
         <c:majorTickMark val="out"/>
         <c:minorTickMark val="none"/>
         <c:tickLblPos val="nextTo"/>
-        <c:crossAx val="68237952"/>
+        <c:crossAx val="67613824"/>
         <c:crosses val="autoZero"/>
         <c:crossBetween val="between"/>
       </c:valAx>
@@ -385,11 +385,11 @@
           <c:showBubbleSize val="0"/>
         </c:dLbls>
         <c:gapWidth val="150"/>
-        <c:axId val="68560384"/>
-        <c:axId val="68561920"/>
+        <c:axId val="68270336"/>
+        <c:axId val="68448256"/>
       </c:barChart>
       <c:catAx>
-        <c:axId val="68560384"/>
+        <c:axId val="68270336"/>
         <c:scaling>
           <c:orientation val="minMax"/>
         </c:scaling>
@@ -398,7 +398,7 @@
         <c:majorTickMark val="out"/>
         <c:minorTickMark val="none"/>
         <c:tickLblPos val="nextTo"/>
-        <c:crossAx val="68561920"/>
+        <c:crossAx val="68448256"/>
         <c:crosses val="autoZero"/>
         <c:auto val="1"/>
         <c:lblAlgn val="ctr"/>
@@ -406,7 +406,7 @@
         <c:noMultiLvlLbl val="0"/>
       </c:catAx>
       <c:valAx>
-        <c:axId val="68561920"/>
+        <c:axId val="68448256"/>
         <c:scaling>
           <c:orientation val="minMax"/>
           <c:min val="0"/>
@@ -418,7 +418,7 @@
         <c:majorTickMark val="out"/>
         <c:minorTickMark val="none"/>
         <c:tickLblPos val="nextTo"/>
-        <c:crossAx val="68560384"/>
+        <c:crossAx val="68270336"/>
         <c:crosses val="autoZero"/>
         <c:crossBetween val="between"/>
       </c:valAx>
@@ -8704,11 +8704,7 @@
                     <a:p>
                       <a:r>
                         <a:rPr lang="en-US" smtClean="0"/>
-                        <a:t>Still </a:t>
-                      </a:r>
-                      <a:r>
-                        <a:rPr lang="en-US" smtClean="0"/>
-                        <a:t>debugging</a:t>
+                        <a:t>Still debugging</a:t>
                       </a:r>
                       <a:endParaRPr lang="en-US" dirty="0"/>
                     </a:p>
@@ -9102,14 +9098,7 @@
           </a:p>
           <a:p>
             <a:r>
-              <a:rPr lang="en-GB" sz="2800" dirty="0" smtClean="0"/>
-              <a:t>Problems that might threaten our progress</a:t>
-            </a:r>
-            <a:endParaRPr lang="en-GB" sz="2800" dirty="0"/>
-          </a:p>
-          <a:p>
-            <a:r>
-              <a:rPr lang="en-GB" sz="2800" dirty="0" smtClean="0"/>
+              <a:rPr lang="en-GB" sz="2800" smtClean="0"/>
               <a:t>Task </a:t>
             </a:r>
             <a:r>

</xml_diff>